<commit_message>
Novo artigo sobre SVM e a Pauta da apresentação
</commit_message>
<xml_diff>
--- a/docs/Apresentação.pptx
+++ b/docs/Apresentação.pptx
@@ -122,6 +122,11 @@
       </a:defRPr>
     </a:lvl9pPr>
   </p:defaultTextStyle>
+  <p:extLst>
+    <p:ext uri="{EFAFB233-063F-42B5-8137-9DF3F51BA10A}">
+      <p15:sldGuideLst xmlns:p15="http://schemas.microsoft.com/office/powerpoint/2012/main"/>
+    </p:ext>
+  </p:extLst>
 </p:presentation>
 </file>
 
@@ -207,7 +212,7 @@
           <a:p>
             <a:fld id="{ED6C2EB7-4FE1-0145-BAAF-4D7DE7DF88C9}" type="datetimeFigureOut">
               <a:rPr lang="pt-BR" smtClean="0"/>
-              <a:t>13/06/15</a:t>
+              <a:t>15/06/2015</a:t>
             </a:fld>
             <a:endParaRPr lang="pt-BR"/>
           </a:p>
@@ -366,7 +371,7 @@
           <a:p>
             <a:fld id="{50F572C4-1653-A746-8182-35101AF0EA0D}" type="slidenum">
               <a:rPr lang="pt-BR" smtClean="0"/>
-              <a:t>‹n.º›</a:t>
+              <a:t>‹nº›</a:t>
             </a:fld>
             <a:endParaRPr lang="pt-BR"/>
           </a:p>
@@ -666,7 +671,7 @@
           <a:p>
             <a:fld id="{7CF910A2-AEE9-494C-8ECE-D83CCFC17B69}" type="datetime1">
               <a:rPr lang="pt-BR" smtClean="0"/>
-              <a:t>13/06/15</a:t>
+              <a:t>15/06/2015</a:t>
             </a:fld>
             <a:endParaRPr lang="en-US" dirty="0"/>
           </a:p>
@@ -709,7 +714,7 @@
             <a:fld id="{D57F1E4F-1CFF-5643-939E-217C01CDF565}" type="slidenum">
               <a:rPr lang="en-US" smtClean="0"/>
               <a:pPr/>
-              <a:t>‹n.º›</a:t>
+              <a:t>‹nº›</a:t>
             </a:fld>
             <a:endParaRPr lang="en-US" dirty="0" smtClean="0"/>
           </a:p>
@@ -1108,7 +1113,7 @@
           <a:p>
             <a:fld id="{DB63BD9E-5B88-0C4B-9505-8FCED04AF271}" type="datetime1">
               <a:rPr lang="pt-BR" smtClean="0"/>
-              <a:t>13/06/15</a:t>
+              <a:t>15/06/2015</a:t>
             </a:fld>
             <a:endParaRPr lang="en-US" dirty="0"/>
           </a:p>
@@ -1151,12 +1156,12 @@
             <a:fld id="{4ABF6952-4E48-774C-830F-434D8CB1F8AA}" type="slidenum">
               <a:rPr lang="en-US" smtClean="0"/>
               <a:pPr/>
-              <a:t>‹n.º›</a:t>
+              <a:t>‹nº›</a:t>
             </a:fld>
             <a:fld id="{D57F1E4F-1CFF-5643-939E-217C01CDF565}" type="slidenum">
               <a:rPr lang="en-US" smtClean="0"/>
               <a:pPr/>
-              <a:t>‹n.º›</a:t>
+              <a:t>‹nº›</a:t>
             </a:fld>
             <a:endParaRPr lang="en-US" dirty="0"/>
           </a:p>
@@ -1364,7 +1369,7 @@
           <a:p>
             <a:fld id="{2D31E35D-B975-3F4F-BFBA-FC0F271430BE}" type="datetime1">
               <a:rPr lang="pt-BR" smtClean="0"/>
-              <a:t>13/06/15</a:t>
+              <a:t>15/06/2015</a:t>
             </a:fld>
             <a:endParaRPr lang="en-US" dirty="0"/>
           </a:p>
@@ -1407,12 +1412,12 @@
             <a:fld id="{4ABF6952-4E48-774C-830F-434D8CB1F8AA}" type="slidenum">
               <a:rPr lang="en-US" smtClean="0"/>
               <a:pPr/>
-              <a:t>‹n.º›</a:t>
+              <a:t>‹nº›</a:t>
             </a:fld>
             <a:fld id="{D57F1E4F-1CFF-5643-939E-217C01CDF565}" type="slidenum">
               <a:rPr lang="en-US" smtClean="0"/>
               <a:pPr/>
-              <a:t>‹n.º›</a:t>
+              <a:t>‹nº›</a:t>
             </a:fld>
             <a:endParaRPr lang="en-US" dirty="0"/>
           </a:p>
@@ -1678,7 +1683,7 @@
           <a:p>
             <a:fld id="{C11DC2A2-1E04-6147-8E09-7B480616B389}" type="datetime1">
               <a:rPr lang="pt-BR" smtClean="0"/>
-              <a:t>13/06/15</a:t>
+              <a:t>15/06/2015</a:t>
             </a:fld>
             <a:endParaRPr lang="en-US" dirty="0"/>
           </a:p>
@@ -1721,12 +1726,12 @@
             <a:fld id="{4ABF6952-4E48-774C-830F-434D8CB1F8AA}" type="slidenum">
               <a:rPr lang="en-US" smtClean="0"/>
               <a:pPr/>
-              <a:t>‹n.º›</a:t>
+              <a:t>‹nº›</a:t>
             </a:fld>
             <a:fld id="{D57F1E4F-1CFF-5643-939E-217C01CDF565}" type="slidenum">
               <a:rPr lang="en-US" smtClean="0"/>
               <a:pPr/>
-              <a:t>‹n.º›</a:t>
+              <a:t>‹nº›</a:t>
             </a:fld>
             <a:endParaRPr lang="en-US" dirty="0"/>
           </a:p>
@@ -2002,7 +2007,7 @@
           <a:p>
             <a:fld id="{49E6E62F-DF90-7C45-B32E-F018412E7A1A}" type="datetime1">
               <a:rPr lang="pt-BR" smtClean="0"/>
-              <a:t>13/06/15</a:t>
+              <a:t>15/06/2015</a:t>
             </a:fld>
             <a:endParaRPr lang="en-US" dirty="0"/>
           </a:p>
@@ -2045,12 +2050,12 @@
             <a:fld id="{4ABF6952-4E48-774C-830F-434D8CB1F8AA}" type="slidenum">
               <a:rPr lang="en-US" smtClean="0"/>
               <a:pPr/>
-              <a:t>‹n.º›</a:t>
+              <a:t>‹nº›</a:t>
             </a:fld>
             <a:fld id="{D57F1E4F-1CFF-5643-939E-217C01CDF565}" type="slidenum">
               <a:rPr lang="en-US" smtClean="0"/>
               <a:pPr/>
-              <a:t>‹n.º›</a:t>
+              <a:t>‹nº›</a:t>
             </a:fld>
             <a:endParaRPr lang="en-US" dirty="0"/>
           </a:p>
@@ -2310,7 +2315,7 @@
           <a:p>
             <a:fld id="{010D4701-6CC1-3046-9984-CD40D45677DA}" type="datetime1">
               <a:rPr lang="pt-BR" smtClean="0"/>
-              <a:t>13/06/15</a:t>
+              <a:t>15/06/2015</a:t>
             </a:fld>
             <a:endParaRPr lang="en-US" dirty="0"/>
           </a:p>
@@ -2353,12 +2358,12 @@
             <a:fld id="{4ABF6952-4E48-774C-830F-434D8CB1F8AA}" type="slidenum">
               <a:rPr lang="en-US" smtClean="0"/>
               <a:pPr/>
-              <a:t>‹n.º›</a:t>
+              <a:t>‹nº›</a:t>
             </a:fld>
             <a:fld id="{D57F1E4F-1CFF-5643-939E-217C01CDF565}" type="slidenum">
               <a:rPr lang="en-US" smtClean="0"/>
               <a:pPr/>
-              <a:t>‹n.º›</a:t>
+              <a:t>‹nº›</a:t>
             </a:fld>
             <a:endParaRPr lang="en-US" dirty="0"/>
           </a:p>
@@ -2683,7 +2688,7 @@
           <a:p>
             <a:fld id="{F51D1A75-3DD2-BF4B-A756-F4C41EA5D713}" type="datetime1">
               <a:rPr lang="pt-BR" smtClean="0"/>
-              <a:t>13/06/15</a:t>
+              <a:t>15/06/2015</a:t>
             </a:fld>
             <a:endParaRPr lang="en-US" dirty="0"/>
           </a:p>
@@ -2726,12 +2731,12 @@
             <a:fld id="{4ABF6952-4E48-774C-830F-434D8CB1F8AA}" type="slidenum">
               <a:rPr lang="en-US" smtClean="0"/>
               <a:pPr/>
-              <a:t>‹n.º›</a:t>
+              <a:t>‹nº›</a:t>
             </a:fld>
             <a:fld id="{D57F1E4F-1CFF-5643-939E-217C01CDF565}" type="slidenum">
               <a:rPr lang="en-US" smtClean="0"/>
               <a:pPr/>
-              <a:t>‹n.º›</a:t>
+              <a:t>‹nº›</a:t>
             </a:fld>
             <a:endParaRPr lang="en-US" dirty="0"/>
           </a:p>
@@ -2863,7 +2868,7 @@
           <a:p>
             <a:fld id="{D0B0705F-BFA7-2146-82E4-F98876D59FC6}" type="datetime1">
               <a:rPr lang="pt-BR" smtClean="0"/>
-              <a:t>13/06/15</a:t>
+              <a:t>15/06/2015</a:t>
             </a:fld>
             <a:endParaRPr lang="en-US" dirty="0"/>
           </a:p>
@@ -2906,7 +2911,7 @@
             <a:fld id="{D57F1E4F-1CFF-5643-939E-217C01CDF565}" type="slidenum">
               <a:rPr lang="en-US" smtClean="0"/>
               <a:pPr/>
-              <a:t>‹n.º›</a:t>
+              <a:t>‹nº›</a:t>
             </a:fld>
             <a:endParaRPr lang="en-US" dirty="0"/>
           </a:p>
@@ -3044,7 +3049,7 @@
           <a:p>
             <a:fld id="{AA053136-878A-1E42-8EBC-EE9076C842CC}" type="datetime1">
               <a:rPr lang="pt-BR" smtClean="0"/>
-              <a:t>13/06/15</a:t>
+              <a:t>15/06/2015</a:t>
             </a:fld>
             <a:endParaRPr lang="en-US" dirty="0"/>
           </a:p>
@@ -3087,7 +3092,7 @@
             <a:fld id="{D57F1E4F-1CFF-5643-939E-217C01CDF565}" type="slidenum">
               <a:rPr lang="en-US" smtClean="0"/>
               <a:pPr/>
-              <a:t>‹n.º›</a:t>
+              <a:t>‹nº›</a:t>
             </a:fld>
             <a:endParaRPr lang="en-US" dirty="0"/>
           </a:p>
@@ -3215,7 +3220,7 @@
           <a:p>
             <a:fld id="{18A0768A-70D4-5341-89FE-2C77E4E108E6}" type="datetime1">
               <a:rPr lang="pt-BR" smtClean="0"/>
-              <a:t>13/06/15</a:t>
+              <a:t>15/06/2015</a:t>
             </a:fld>
             <a:endParaRPr lang="en-US" dirty="0"/>
           </a:p>
@@ -3258,7 +3263,7 @@
             <a:fld id="{D57F1E4F-1CFF-5643-939E-217C01CDF565}" type="slidenum">
               <a:rPr lang="en-US" smtClean="0"/>
               <a:pPr/>
-              <a:t>‹n.º›</a:t>
+              <a:t>‹nº›</a:t>
             </a:fld>
             <a:endParaRPr lang="en-US" dirty="0"/>
           </a:p>
@@ -3539,7 +3544,7 @@
             <a:fld id="{D57F1E4F-1CFF-5643-939E-217C01CDF565}" type="slidenum">
               <a:rPr lang="en-US" smtClean="0"/>
               <a:pPr/>
-              <a:t>‹n.º›</a:t>
+              <a:t>‹nº›</a:t>
             </a:fld>
             <a:endParaRPr lang="en-US" dirty="0"/>
           </a:p>
@@ -3740,7 +3745,7 @@
           <a:p>
             <a:fld id="{B56619BA-50EB-BE4E-B3B6-B042CA3512F6}" type="datetime1">
               <a:rPr lang="pt-BR" smtClean="0"/>
-              <a:t>13/06/15</a:t>
+              <a:t>15/06/2015</a:t>
             </a:fld>
             <a:endParaRPr lang="en-US" dirty="0"/>
           </a:p>
@@ -3783,7 +3788,7 @@
             <a:fld id="{D57F1E4F-1CFF-5643-939E-217C01CDF565}" type="slidenum">
               <a:rPr lang="en-US" smtClean="0"/>
               <a:pPr/>
-              <a:t>‹n.º›</a:t>
+              <a:t>‹nº›</a:t>
             </a:fld>
             <a:endParaRPr lang="en-US" dirty="0"/>
           </a:p>
@@ -4123,7 +4128,7 @@
           <a:p>
             <a:fld id="{E7A703A8-BCAB-3341-BE6C-F6E5BAA2F38C}" type="datetime1">
               <a:rPr lang="pt-BR" smtClean="0"/>
-              <a:t>13/06/15</a:t>
+              <a:t>15/06/2015</a:t>
             </a:fld>
             <a:endParaRPr lang="en-US" dirty="0"/>
           </a:p>
@@ -4166,7 +4171,7 @@
             <a:fld id="{D57F1E4F-1CFF-5643-939E-217C01CDF565}" type="slidenum">
               <a:rPr lang="en-US" smtClean="0"/>
               <a:pPr/>
-              <a:t>‹n.º›</a:t>
+              <a:t>‹nº›</a:t>
             </a:fld>
             <a:endParaRPr lang="en-US" dirty="0"/>
           </a:p>
@@ -4242,7 +4247,7 @@
           <a:p>
             <a:fld id="{354A6A2B-BB1B-ED42-B3E6-8A2921BA1BFD}" type="datetime1">
               <a:rPr lang="pt-BR" smtClean="0"/>
-              <a:t>13/06/15</a:t>
+              <a:t>15/06/2015</a:t>
             </a:fld>
             <a:endParaRPr lang="en-US" dirty="0"/>
           </a:p>
@@ -4285,7 +4290,7 @@
             <a:fld id="{D57F1E4F-1CFF-5643-939E-217C01CDF565}" type="slidenum">
               <a:rPr lang="en-US" smtClean="0"/>
               <a:pPr/>
-              <a:t>‹n.º›</a:t>
+              <a:t>‹nº›</a:t>
             </a:fld>
             <a:endParaRPr lang="en-US" dirty="0"/>
           </a:p>
@@ -4338,7 +4343,7 @@
           <a:p>
             <a:fld id="{64B63E80-2319-074E-85E8-2C01938C4310}" type="datetime1">
               <a:rPr lang="pt-BR" smtClean="0"/>
-              <a:t>13/06/15</a:t>
+              <a:t>15/06/2015</a:t>
             </a:fld>
             <a:endParaRPr lang="en-US" dirty="0"/>
           </a:p>
@@ -4381,7 +4386,7 @@
             <a:fld id="{D57F1E4F-1CFF-5643-939E-217C01CDF565}" type="slidenum">
               <a:rPr lang="en-US" smtClean="0"/>
               <a:pPr/>
-              <a:t>‹n.º›</a:t>
+              <a:t>‹nº›</a:t>
             </a:fld>
             <a:endParaRPr lang="en-US" dirty="0"/>
           </a:p>
@@ -4599,7 +4604,7 @@
           <a:p>
             <a:fld id="{83DCC015-2D07-C548-8FB4-2780CACB760D}" type="datetime1">
               <a:rPr lang="pt-BR" smtClean="0"/>
-              <a:t>13/06/15</a:t>
+              <a:t>15/06/2015</a:t>
             </a:fld>
             <a:endParaRPr lang="en-US" dirty="0"/>
           </a:p>
@@ -4642,7 +4647,7 @@
             <a:fld id="{D57F1E4F-1CFF-5643-939E-217C01CDF565}" type="slidenum">
               <a:rPr lang="en-US" smtClean="0"/>
               <a:pPr/>
-              <a:t>‹n.º›</a:t>
+              <a:t>‹nº›</a:t>
             </a:fld>
             <a:endParaRPr lang="en-US" dirty="0"/>
           </a:p>
@@ -4888,7 +4893,7 @@
           <a:p>
             <a:fld id="{E528F2E4-DE8D-D64D-8368-708812B696C4}" type="datetime1">
               <a:rPr lang="pt-BR" smtClean="0"/>
-              <a:t>13/06/15</a:t>
+              <a:t>15/06/2015</a:t>
             </a:fld>
             <a:endParaRPr lang="en-US" dirty="0"/>
           </a:p>
@@ -4931,7 +4936,7 @@
             <a:fld id="{D57F1E4F-1CFF-5643-939E-217C01CDF565}" type="slidenum">
               <a:rPr lang="en-US" smtClean="0"/>
               <a:pPr/>
-              <a:t>‹n.º›</a:t>
+              <a:t>‹nº›</a:t>
             </a:fld>
             <a:endParaRPr lang="en-US" dirty="0"/>
           </a:p>
@@ -5295,7 +5300,7 @@
           <a:p>
             <a:fld id="{95913753-D19B-8941-866F-AE50A85BE452}" type="datetime1">
               <a:rPr lang="pt-BR" smtClean="0"/>
-              <a:t>13/06/15</a:t>
+              <a:t>15/06/2015</a:t>
             </a:fld>
             <a:endParaRPr lang="en-US" dirty="0"/>
           </a:p>
@@ -5378,12 +5383,12 @@
             <a:fld id="{4ABF6952-4E48-774C-830F-434D8CB1F8AA}" type="slidenum">
               <a:rPr lang="en-US" smtClean="0"/>
               <a:pPr/>
-              <a:t>‹n.º›</a:t>
+              <a:t>‹nº›</a:t>
             </a:fld>
             <a:fld id="{D57F1E4F-1CFF-5643-939E-217C01CDF565}" type="slidenum">
               <a:rPr lang="en-US" smtClean="0"/>
               <a:pPr/>
-              <a:t>‹n.º›</a:t>
+              <a:t>‹nº›</a:t>
             </a:fld>
             <a:endParaRPr lang="en-US" dirty="0"/>
           </a:p>
@@ -6546,11 +6551,6 @@
               </a:rPr>
               <a:t>15. Agradecimentos</a:t>
             </a:r>
-            <a:endParaRPr lang="pt-BR" sz="1400" dirty="0">
-              <a:solidFill>
-                <a:schemeClr val="tx1"/>
-              </a:solidFill>
-            </a:endParaRPr>
           </a:p>
         </p:txBody>
       </p:sp>
@@ -7313,11 +7313,6 @@
               </a:rPr>
               <a:t>15. Agradecimentos</a:t>
             </a:r>
-            <a:endParaRPr lang="pt-BR" sz="1400" dirty="0">
-              <a:solidFill>
-                <a:schemeClr val="tx1"/>
-              </a:solidFill>
-            </a:endParaRPr>
           </a:p>
         </p:txBody>
       </p:sp>
@@ -7976,11 +7971,6 @@
               </a:rPr>
               <a:t>15. Agradecimentos</a:t>
             </a:r>
-            <a:endParaRPr lang="pt-BR" sz="1400" dirty="0">
-              <a:solidFill>
-                <a:schemeClr val="tx1"/>
-              </a:solidFill>
-            </a:endParaRPr>
           </a:p>
         </p:txBody>
       </p:sp>
@@ -8658,11 +8648,6 @@
               </a:rPr>
               <a:t>15. Agradecimentos</a:t>
             </a:r>
-            <a:endParaRPr lang="pt-BR" sz="1400" dirty="0">
-              <a:solidFill>
-                <a:schemeClr val="tx1"/>
-              </a:solidFill>
-            </a:endParaRPr>
           </a:p>
         </p:txBody>
       </p:sp>
@@ -10003,11 +9988,6 @@
               </a:rPr>
               <a:t>15. Agradecimentos</a:t>
             </a:r>
-            <a:endParaRPr lang="pt-BR" sz="1400" dirty="0">
-              <a:solidFill>
-                <a:schemeClr val="tx1"/>
-              </a:solidFill>
-            </a:endParaRPr>
           </a:p>
         </p:txBody>
       </p:sp>
@@ -10537,11 +10517,6 @@
               </a:rPr>
               <a:t>15. Agradecimentos</a:t>
             </a:r>
-            <a:endParaRPr lang="pt-BR" sz="1400" dirty="0">
-              <a:solidFill>
-                <a:schemeClr val="tx1"/>
-              </a:solidFill>
-            </a:endParaRPr>
           </a:p>
         </p:txBody>
       </p:sp>
@@ -11138,14 +11113,6 @@
               </a:rPr>
               <a:t>15. Agradecimentos</a:t>
             </a:r>
-            <a:endParaRPr lang="pt-BR" sz="1400" dirty="0">
-              <a:solidFill>
-                <a:schemeClr val="bg2">
-                  <a:lumMod val="40000"/>
-                  <a:lumOff val="60000"/>
-                </a:schemeClr>
-              </a:solidFill>
-            </a:endParaRPr>
           </a:p>
         </p:txBody>
       </p:sp>
@@ -11826,11 +11793,6 @@
               </a:rPr>
               <a:t>Agradecimentos</a:t>
             </a:r>
-            <a:endParaRPr lang="pt-BR" sz="1400" dirty="0">
-              <a:solidFill>
-                <a:schemeClr val="tx1"/>
-              </a:solidFill>
-            </a:endParaRPr>
           </a:p>
         </p:txBody>
       </p:sp>
@@ -11873,7 +11835,7 @@
         <p:spPr>
           <a:xfrm>
             <a:off x="1238132" y="3831356"/>
-            <a:ext cx="4578497" cy="1938992"/>
+            <a:ext cx="4578497" cy="1569660"/>
           </a:xfrm>
           <a:prstGeom prst="rect">
             <a:avLst/>
@@ -11919,25 +11881,14 @@
               <a:buChar char="•"/>
             </a:pPr>
             <a:r>
-              <a:rPr lang="pt-BR" sz="2400" dirty="0" smtClean="0"/>
-              <a:t>PROPER/</a:t>
+              <a:rPr lang="pt-BR" sz="2400" smtClean="0"/>
+              <a:t>PROBE/</a:t>
             </a:r>
             <a:r>
               <a:rPr lang="pt-BR" sz="2400" dirty="0" err="1" smtClean="0"/>
               <a:t>Scan</a:t>
             </a:r>
             <a:endParaRPr lang="pt-BR" sz="2400" dirty="0" smtClean="0"/>
-          </a:p>
-          <a:p>
-            <a:pPr marL="285750" indent="-285750">
-              <a:buFont typeface="Arial" charset="0"/>
-              <a:buChar char="•"/>
-            </a:pPr>
-            <a:r>
-              <a:rPr lang="pt-BR" sz="2400" dirty="0" err="1" smtClean="0"/>
-              <a:t>Worm</a:t>
-            </a:r>
-            <a:endParaRPr lang="pt-BR" sz="2400" dirty="0"/>
           </a:p>
         </p:txBody>
       </p:sp>
@@ -12520,11 +12471,6 @@
               </a:rPr>
               <a:t>15. Agradecimentos</a:t>
             </a:r>
-            <a:endParaRPr lang="pt-BR" sz="1400" dirty="0">
-              <a:solidFill>
-                <a:schemeClr val="tx1"/>
-              </a:solidFill>
-            </a:endParaRPr>
           </a:p>
         </p:txBody>
       </p:sp>
@@ -13163,11 +13109,6 @@
               </a:rPr>
               <a:t>15. Agradecimentos</a:t>
             </a:r>
-            <a:endParaRPr lang="pt-BR" sz="1400" dirty="0">
-              <a:solidFill>
-                <a:schemeClr val="tx1"/>
-              </a:solidFill>
-            </a:endParaRPr>
           </a:p>
         </p:txBody>
       </p:sp>
@@ -13233,7 +13174,7 @@
             </a:r>
             <a:r>
               <a:rPr lang="pt-BR" sz="2400" dirty="0" smtClean="0"/>
-              <a:t>são?</a:t>
+              <a:t>é?</a:t>
             </a:r>
           </a:p>
           <a:p>
@@ -13786,11 +13727,6 @@
               </a:rPr>
               <a:t>15. Agradecimentos</a:t>
             </a:r>
-            <a:endParaRPr lang="pt-BR" sz="1400" dirty="0">
-              <a:solidFill>
-                <a:schemeClr val="tx1"/>
-              </a:solidFill>
-            </a:endParaRPr>
           </a:p>
         </p:txBody>
       </p:sp>
@@ -13856,7 +13792,7 @@
             </a:r>
             <a:r>
               <a:rPr lang="pt-BR" sz="2400" dirty="0" smtClean="0"/>
-              <a:t>são?</a:t>
+              <a:t>é?</a:t>
             </a:r>
           </a:p>
           <a:p>
@@ -14405,11 +14341,6 @@
               </a:rPr>
               <a:t>15. Agradecimentos</a:t>
             </a:r>
-            <a:endParaRPr lang="pt-BR" sz="1400" dirty="0">
-              <a:solidFill>
-                <a:schemeClr val="tx1"/>
-              </a:solidFill>
-            </a:endParaRPr>
           </a:p>
         </p:txBody>
       </p:sp>
@@ -14561,7 +14492,6 @@
               <a:rPr lang="pt-BR" sz="1400" dirty="0"/>
               <a:t>.], 2014</a:t>
             </a:r>
-            <a:endParaRPr lang="pt-BR" sz="1400" dirty="0"/>
           </a:p>
         </p:txBody>
       </p:sp>
@@ -15092,11 +15022,6 @@
               </a:rPr>
               <a:t>15. Agradecimentos</a:t>
             </a:r>
-            <a:endParaRPr lang="pt-BR" sz="1400" dirty="0">
-              <a:solidFill>
-                <a:schemeClr val="tx1"/>
-              </a:solidFill>
-            </a:endParaRPr>
           </a:p>
         </p:txBody>
       </p:sp>
@@ -15720,11 +15645,6 @@
               </a:rPr>
               <a:t>15. Agradecimentos</a:t>
             </a:r>
-            <a:endParaRPr lang="pt-BR" sz="1400" dirty="0">
-              <a:solidFill>
-                <a:schemeClr val="tx1"/>
-              </a:solidFill>
-            </a:endParaRPr>
           </a:p>
         </p:txBody>
       </p:sp>
@@ -16300,11 +16220,6 @@
               </a:rPr>
               <a:t>15. Agradecimentos</a:t>
             </a:r>
-            <a:endParaRPr lang="pt-BR" sz="1400" dirty="0">
-              <a:solidFill>
-                <a:schemeClr val="tx1"/>
-              </a:solidFill>
-            </a:endParaRPr>
           </a:p>
         </p:txBody>
       </p:sp>
@@ -16334,7 +16249,6 @@
               <a:rPr lang="pt-BR" sz="1400" i="1" dirty="0"/>
               <a:t>Arquitetura do POLVO</a:t>
             </a:r>
-            <a:endParaRPr lang="pt-BR" sz="1400" i="1" dirty="0"/>
           </a:p>
         </p:txBody>
       </p:sp>

</xml_diff>

<commit_message>
apresentação, adição de cronograma
</commit_message>
<xml_diff>
--- a/docs/Apresentação.pptx
+++ b/docs/Apresentação.pptx
@@ -125,7 +125,7 @@
   </p:defaultTextStyle>
   <p:extLst>
     <p:ext uri="{EFAFB233-063F-42B5-8137-9DF3F51BA10A}">
-      <p15:sldGuideLst xmlns:p15="http://schemas.microsoft.com/office/powerpoint/2012/main"/>
+      <p15:sldGuideLst xmlns:p15="http://schemas.microsoft.com/office/powerpoint/2012/main" xmlns=""/>
     </p:ext>
   </p:extLst>
 </p:presentation>
@@ -372,7 +372,7 @@
           <a:p>
             <a:fld id="{50F572C4-1653-A746-8182-35101AF0EA0D}" type="slidenum">
               <a:rPr lang="pt-BR" smtClean="0"/>
-              <a:t>‹nº›</a:t>
+              <a:t>‹#›</a:t>
             </a:fld>
             <a:endParaRPr lang="pt-BR"/>
           </a:p>
@@ -715,7 +715,7 @@
             <a:fld id="{D57F1E4F-1CFF-5643-939E-217C01CDF565}" type="slidenum">
               <a:rPr lang="en-US" smtClean="0"/>
               <a:pPr/>
-              <a:t>‹nº›</a:t>
+              <a:t>‹#›</a:t>
             </a:fld>
             <a:endParaRPr lang="en-US" dirty="0" smtClean="0"/>
           </a:p>
@@ -908,7 +908,7 @@
   </p:clrMapOvr>
   <p:extLst>
     <p:ext uri="{DCECCB84-F9BA-43D5-87BE-67443E8EF086}">
-      <p15:sldGuideLst xmlns:p15="http://schemas.microsoft.com/office/powerpoint/2012/main"/>
+      <p15:sldGuideLst xmlns:p15="http://schemas.microsoft.com/office/powerpoint/2012/main" xmlns=""/>
     </p:ext>
   </p:extLst>
 </p:sldLayout>
@@ -1157,12 +1157,12 @@
             <a:fld id="{4ABF6952-4E48-774C-830F-434D8CB1F8AA}" type="slidenum">
               <a:rPr lang="en-US" smtClean="0"/>
               <a:pPr/>
-              <a:t>‹nº›</a:t>
+              <a:t>‹#›</a:t>
             </a:fld>
             <a:fld id="{D57F1E4F-1CFF-5643-939E-217C01CDF565}" type="slidenum">
               <a:rPr lang="en-US" smtClean="0"/>
               <a:pPr/>
-              <a:t>‹nº›</a:t>
+              <a:t>‹#›</a:t>
             </a:fld>
             <a:endParaRPr lang="en-US" dirty="0"/>
           </a:p>
@@ -1413,12 +1413,12 @@
             <a:fld id="{4ABF6952-4E48-774C-830F-434D8CB1F8AA}" type="slidenum">
               <a:rPr lang="en-US" smtClean="0"/>
               <a:pPr/>
-              <a:t>‹nº›</a:t>
+              <a:t>‹#›</a:t>
             </a:fld>
             <a:fld id="{D57F1E4F-1CFF-5643-939E-217C01CDF565}" type="slidenum">
               <a:rPr lang="en-US" smtClean="0"/>
               <a:pPr/>
-              <a:t>‹nº›</a:t>
+              <a:t>‹#›</a:t>
             </a:fld>
             <a:endParaRPr lang="en-US" dirty="0"/>
           </a:p>
@@ -1727,12 +1727,12 @@
             <a:fld id="{4ABF6952-4E48-774C-830F-434D8CB1F8AA}" type="slidenum">
               <a:rPr lang="en-US" smtClean="0"/>
               <a:pPr/>
-              <a:t>‹nº›</a:t>
+              <a:t>‹#›</a:t>
             </a:fld>
             <a:fld id="{D57F1E4F-1CFF-5643-939E-217C01CDF565}" type="slidenum">
               <a:rPr lang="en-US" smtClean="0"/>
               <a:pPr/>
-              <a:t>‹nº›</a:t>
+              <a:t>‹#›</a:t>
             </a:fld>
             <a:endParaRPr lang="en-US" dirty="0"/>
           </a:p>
@@ -2051,12 +2051,12 @@
             <a:fld id="{4ABF6952-4E48-774C-830F-434D8CB1F8AA}" type="slidenum">
               <a:rPr lang="en-US" smtClean="0"/>
               <a:pPr/>
-              <a:t>‹nº›</a:t>
+              <a:t>‹#›</a:t>
             </a:fld>
             <a:fld id="{D57F1E4F-1CFF-5643-939E-217C01CDF565}" type="slidenum">
               <a:rPr lang="en-US" smtClean="0"/>
               <a:pPr/>
-              <a:t>‹nº›</a:t>
+              <a:t>‹#›</a:t>
             </a:fld>
             <a:endParaRPr lang="en-US" dirty="0"/>
           </a:p>
@@ -2359,12 +2359,12 @@
             <a:fld id="{4ABF6952-4E48-774C-830F-434D8CB1F8AA}" type="slidenum">
               <a:rPr lang="en-US" smtClean="0"/>
               <a:pPr/>
-              <a:t>‹nº›</a:t>
+              <a:t>‹#›</a:t>
             </a:fld>
             <a:fld id="{D57F1E4F-1CFF-5643-939E-217C01CDF565}" type="slidenum">
               <a:rPr lang="en-US" smtClean="0"/>
               <a:pPr/>
-              <a:t>‹nº›</a:t>
+              <a:t>‹#›</a:t>
             </a:fld>
             <a:endParaRPr lang="en-US" dirty="0"/>
           </a:p>
@@ -2732,12 +2732,12 @@
             <a:fld id="{4ABF6952-4E48-774C-830F-434D8CB1F8AA}" type="slidenum">
               <a:rPr lang="en-US" smtClean="0"/>
               <a:pPr/>
-              <a:t>‹nº›</a:t>
+              <a:t>‹#›</a:t>
             </a:fld>
             <a:fld id="{D57F1E4F-1CFF-5643-939E-217C01CDF565}" type="slidenum">
               <a:rPr lang="en-US" smtClean="0"/>
               <a:pPr/>
-              <a:t>‹nº›</a:t>
+              <a:t>‹#›</a:t>
             </a:fld>
             <a:endParaRPr lang="en-US" dirty="0"/>
           </a:p>
@@ -2912,7 +2912,7 @@
             <a:fld id="{D57F1E4F-1CFF-5643-939E-217C01CDF565}" type="slidenum">
               <a:rPr lang="en-US" smtClean="0"/>
               <a:pPr/>
-              <a:t>‹nº›</a:t>
+              <a:t>‹#›</a:t>
             </a:fld>
             <a:endParaRPr lang="en-US" dirty="0"/>
           </a:p>
@@ -3093,7 +3093,7 @@
             <a:fld id="{D57F1E4F-1CFF-5643-939E-217C01CDF565}" type="slidenum">
               <a:rPr lang="en-US" smtClean="0"/>
               <a:pPr/>
-              <a:t>‹nº›</a:t>
+              <a:t>‹#›</a:t>
             </a:fld>
             <a:endParaRPr lang="en-US" dirty="0"/>
           </a:p>
@@ -3264,7 +3264,7 @@
             <a:fld id="{D57F1E4F-1CFF-5643-939E-217C01CDF565}" type="slidenum">
               <a:rPr lang="en-US" smtClean="0"/>
               <a:pPr/>
-              <a:t>‹nº›</a:t>
+              <a:t>‹#›</a:t>
             </a:fld>
             <a:endParaRPr lang="en-US" dirty="0"/>
           </a:p>
@@ -3545,7 +3545,7 @@
             <a:fld id="{D57F1E4F-1CFF-5643-939E-217C01CDF565}" type="slidenum">
               <a:rPr lang="en-US" smtClean="0"/>
               <a:pPr/>
-              <a:t>‹nº›</a:t>
+              <a:t>‹#›</a:t>
             </a:fld>
             <a:endParaRPr lang="en-US" dirty="0"/>
           </a:p>
@@ -3789,7 +3789,7 @@
             <a:fld id="{D57F1E4F-1CFF-5643-939E-217C01CDF565}" type="slidenum">
               <a:rPr lang="en-US" smtClean="0"/>
               <a:pPr/>
-              <a:t>‹nº›</a:t>
+              <a:t>‹#›</a:t>
             </a:fld>
             <a:endParaRPr lang="en-US" dirty="0"/>
           </a:p>
@@ -4172,7 +4172,7 @@
             <a:fld id="{D57F1E4F-1CFF-5643-939E-217C01CDF565}" type="slidenum">
               <a:rPr lang="en-US" smtClean="0"/>
               <a:pPr/>
-              <a:t>‹nº›</a:t>
+              <a:t>‹#›</a:t>
             </a:fld>
             <a:endParaRPr lang="en-US" dirty="0"/>
           </a:p>
@@ -4291,7 +4291,7 @@
             <a:fld id="{D57F1E4F-1CFF-5643-939E-217C01CDF565}" type="slidenum">
               <a:rPr lang="en-US" smtClean="0"/>
               <a:pPr/>
-              <a:t>‹nº›</a:t>
+              <a:t>‹#›</a:t>
             </a:fld>
             <a:endParaRPr lang="en-US" dirty="0"/>
           </a:p>
@@ -4387,7 +4387,7 @@
             <a:fld id="{D57F1E4F-1CFF-5643-939E-217C01CDF565}" type="slidenum">
               <a:rPr lang="en-US" smtClean="0"/>
               <a:pPr/>
-              <a:t>‹nº›</a:t>
+              <a:t>‹#›</a:t>
             </a:fld>
             <a:endParaRPr lang="en-US" dirty="0"/>
           </a:p>
@@ -4405,7 +4405,7 @@
   </p:clrMapOvr>
   <p:extLst>
     <p:ext uri="{DCECCB84-F9BA-43D5-87BE-67443E8EF086}">
-      <p15:sldGuideLst xmlns:p15="http://schemas.microsoft.com/office/powerpoint/2012/main"/>
+      <p15:sldGuideLst xmlns:p15="http://schemas.microsoft.com/office/powerpoint/2012/main" xmlns=""/>
     </p:ext>
   </p:extLst>
 </p:sldLayout>
@@ -4648,7 +4648,7 @@
             <a:fld id="{D57F1E4F-1CFF-5643-939E-217C01CDF565}" type="slidenum">
               <a:rPr lang="en-US" smtClean="0"/>
               <a:pPr/>
-              <a:t>‹nº›</a:t>
+              <a:t>‹#›</a:t>
             </a:fld>
             <a:endParaRPr lang="en-US" dirty="0"/>
           </a:p>
@@ -4666,7 +4666,7 @@
   </p:clrMapOvr>
   <p:extLst>
     <p:ext uri="{DCECCB84-F9BA-43D5-87BE-67443E8EF086}">
-      <p15:sldGuideLst xmlns:p15="http://schemas.microsoft.com/office/powerpoint/2012/main"/>
+      <p15:sldGuideLst xmlns:p15="http://schemas.microsoft.com/office/powerpoint/2012/main" xmlns=""/>
     </p:ext>
   </p:extLst>
 </p:sldLayout>
@@ -4937,7 +4937,7 @@
             <a:fld id="{D57F1E4F-1CFF-5643-939E-217C01CDF565}" type="slidenum">
               <a:rPr lang="en-US" smtClean="0"/>
               <a:pPr/>
-              <a:t>‹nº›</a:t>
+              <a:t>‹#›</a:t>
             </a:fld>
             <a:endParaRPr lang="en-US" dirty="0"/>
           </a:p>
@@ -5384,12 +5384,12 @@
             <a:fld id="{4ABF6952-4E48-774C-830F-434D8CB1F8AA}" type="slidenum">
               <a:rPr lang="en-US" smtClean="0"/>
               <a:pPr/>
-              <a:t>‹nº›</a:t>
+              <a:t>‹#›</a:t>
             </a:fld>
             <a:fld id="{D57F1E4F-1CFF-5643-939E-217C01CDF565}" type="slidenum">
               <a:rPr lang="en-US" smtClean="0"/>
               <a:pPr/>
-              <a:t>‹nº›</a:t>
+              <a:t>‹#›</a:t>
             </a:fld>
             <a:endParaRPr lang="en-US" dirty="0"/>
           </a:p>
@@ -5825,7 +5825,7 @@
   </p:txStyles>
   <p:extLst>
     <p:ext uri="{27BBF7A9-308A-43DC-89C8-2F10F3537804}">
-      <p15:sldGuideLst xmlns:p15="http://schemas.microsoft.com/office/powerpoint/2012/main"/>
+      <p15:sldGuideLst xmlns:p15="http://schemas.microsoft.com/office/powerpoint/2012/main" xmlns=""/>
     </p:ext>
   </p:extLst>
 </p:sldMaster>
@@ -6603,11 +6603,6 @@
               </a:rPr>
               <a:t>16. Agradecimentos</a:t>
             </a:r>
-            <a:endParaRPr lang="pt-BR" sz="1400" dirty="0">
-              <a:solidFill>
-                <a:schemeClr val="tx1"/>
-              </a:solidFill>
-            </a:endParaRPr>
           </a:p>
         </p:txBody>
       </p:sp>
@@ -7409,11 +7404,6 @@
               </a:rPr>
               <a:t>16. Agradecimentos</a:t>
             </a:r>
-            <a:endParaRPr lang="pt-BR" sz="1400" dirty="0">
-              <a:solidFill>
-                <a:schemeClr val="tx1"/>
-              </a:solidFill>
-            </a:endParaRPr>
           </a:p>
         </p:txBody>
       </p:sp>
@@ -8111,11 +8101,6 @@
               </a:rPr>
               <a:t>16. Agradecimentos</a:t>
             </a:r>
-            <a:endParaRPr lang="pt-BR" sz="1400" dirty="0">
-              <a:solidFill>
-                <a:schemeClr val="tx1"/>
-              </a:solidFill>
-            </a:endParaRPr>
           </a:p>
         </p:txBody>
       </p:sp>
@@ -8809,14 +8794,997 @@
               </a:rPr>
               <a:t>16. Agradecimentos</a:t>
             </a:r>
-            <a:endParaRPr lang="pt-BR" sz="1400" dirty="0">
-              <a:solidFill>
-                <a:schemeClr val="tx1"/>
-              </a:solidFill>
-            </a:endParaRPr>
-          </a:p>
-        </p:txBody>
-      </p:sp>
+          </a:p>
+        </p:txBody>
+      </p:sp>
+      <p:graphicFrame>
+        <p:nvGraphicFramePr>
+          <p:cNvPr id="3" name="Table 2"/>
+          <p:cNvGraphicFramePr>
+            <a:graphicFrameLocks noGrp="1"/>
+          </p:cNvGraphicFramePr>
+          <p:nvPr>
+            <p:extLst>
+              <p:ext uri="{D42A27DB-BD31-4B8C-83A1-F6EECF244321}">
+                <p14:modId xmlns:p14="http://schemas.microsoft.com/office/powerpoint/2010/main" val="1224237310"/>
+              </p:ext>
+            </p:extLst>
+          </p:nvPr>
+        </p:nvGraphicFramePr>
+        <p:xfrm>
+          <a:off x="247650" y="881323"/>
+          <a:ext cx="8852105" cy="4876800"/>
+        </p:xfrm>
+        <a:graphic>
+          <a:graphicData uri="http://schemas.openxmlformats.org/drawingml/2006/table">
+            <a:tbl>
+              <a:tblPr>
+                <a:tableStyleId>{5C22544A-7EE6-4342-B048-85BDC9FD1C3A}</a:tableStyleId>
+              </a:tblPr>
+              <a:tblGrid>
+                <a:gridCol w="838200"/>
+                <a:gridCol w="8013905"/>
+              </a:tblGrid>
+              <a:tr h="429434">
+                <a:tc>
+                  <a:txBody>
+                    <a:bodyPr/>
+                    <a:lstStyle/>
+                    <a:p>
+                      <a:pPr algn="ctr" fontAlgn="b"/>
+                      <a:r>
+                        <a:rPr lang="pt-BR" sz="1100" u="none" strike="noStrike" dirty="0">
+                          <a:effectLst/>
+                        </a:rPr>
+                        <a:t>Semana</a:t>
+                      </a:r>
+                      <a:endParaRPr lang="pt-BR" sz="1100" b="1" i="0" u="none" strike="noStrike" dirty="0">
+                        <a:solidFill>
+                          <a:srgbClr val="FFFFFF"/>
+                        </a:solidFill>
+                        <a:effectLst/>
+                        <a:latin typeface="Calibri"/>
+                      </a:endParaRPr>
+                    </a:p>
+                  </a:txBody>
+                  <a:tcPr marL="9183" marR="9183" marT="9183" marB="0" anchor="ctr"/>
+                </a:tc>
+                <a:tc>
+                  <a:txBody>
+                    <a:bodyPr/>
+                    <a:lstStyle/>
+                    <a:p>
+                      <a:pPr algn="l" fontAlgn="b"/>
+                      <a:r>
+                        <a:rPr lang="pt-BR" sz="1100" u="none" strike="noStrike" dirty="0">
+                          <a:effectLst/>
+                        </a:rPr>
+                        <a:t> Atividade</a:t>
+                      </a:r>
+                      <a:endParaRPr lang="pt-BR" sz="1100" b="1" i="0" u="none" strike="noStrike" dirty="0">
+                        <a:solidFill>
+                          <a:srgbClr val="FFFFFF"/>
+                        </a:solidFill>
+                        <a:effectLst/>
+                        <a:latin typeface="Calibri"/>
+                      </a:endParaRPr>
+                    </a:p>
+                  </a:txBody>
+                  <a:tcPr marL="9183" marR="9183" marT="9183" marB="0" anchor="ctr"/>
+                </a:tc>
+              </a:tr>
+              <a:tr h="292401">
+                <a:tc>
+                  <a:txBody>
+                    <a:bodyPr/>
+                    <a:lstStyle/>
+                    <a:p>
+                      <a:pPr algn="ctr" fontAlgn="b"/>
+                      <a:r>
+                        <a:rPr lang="pt-BR" sz="1100" u="none" strike="noStrike" dirty="0">
+                          <a:effectLst/>
+                        </a:rPr>
+                        <a:t>1</a:t>
+                      </a:r>
+                      <a:endParaRPr lang="pt-BR" sz="1100" b="0" i="0" u="none" strike="noStrike" dirty="0">
+                        <a:solidFill>
+                          <a:srgbClr val="000000"/>
+                        </a:solidFill>
+                        <a:effectLst/>
+                        <a:latin typeface="Calibri"/>
+                      </a:endParaRPr>
+                    </a:p>
+                  </a:txBody>
+                  <a:tcPr marL="9183" marR="9183" marT="9183" marB="0" anchor="ctr"/>
+                </a:tc>
+                <a:tc>
+                  <a:txBody>
+                    <a:bodyPr/>
+                    <a:lstStyle/>
+                    <a:p>
+                      <a:pPr algn="l" fontAlgn="b"/>
+                      <a:r>
+                        <a:rPr lang="pt-BR" sz="1100" u="none" strike="noStrike" dirty="0">
+                          <a:effectLst/>
+                        </a:rPr>
+                        <a:t>Analise de trafego de pacotes em rede, criar aplicação em Go para ler e realizar log das operações na rede</a:t>
+                      </a:r>
+                      <a:endParaRPr lang="pt-BR" sz="1100" b="0" i="0" u="none" strike="noStrike" dirty="0">
+                        <a:solidFill>
+                          <a:srgbClr val="000000"/>
+                        </a:solidFill>
+                        <a:effectLst/>
+                        <a:latin typeface="Calibri"/>
+                      </a:endParaRPr>
+                    </a:p>
+                  </a:txBody>
+                  <a:tcPr marL="9183" marR="9183" marT="9183" marB="0" anchor="ctr"/>
+                </a:tc>
+              </a:tr>
+              <a:tr h="355597">
+                <a:tc>
+                  <a:txBody>
+                    <a:bodyPr/>
+                    <a:lstStyle/>
+                    <a:p>
+                      <a:pPr algn="ctr" fontAlgn="b"/>
+                      <a:r>
+                        <a:rPr lang="pt-BR" sz="1100" u="none" strike="noStrike" dirty="0">
+                          <a:effectLst/>
+                        </a:rPr>
+                        <a:t>2</a:t>
+                      </a:r>
+                      <a:endParaRPr lang="pt-BR" sz="1100" b="0" i="0" u="none" strike="noStrike" dirty="0">
+                        <a:solidFill>
+                          <a:srgbClr val="000000"/>
+                        </a:solidFill>
+                        <a:effectLst/>
+                        <a:latin typeface="Calibri"/>
+                      </a:endParaRPr>
+                    </a:p>
+                  </a:txBody>
+                  <a:tcPr marL="9183" marR="9183" marT="9183" marB="0" anchor="ctr"/>
+                </a:tc>
+                <a:tc>
+                  <a:txBody>
+                    <a:bodyPr/>
+                    <a:lstStyle/>
+                    <a:p>
+                      <a:pPr algn="l" fontAlgn="b"/>
+                      <a:r>
+                        <a:rPr lang="pt-BR" sz="1100" u="none" strike="noStrike" dirty="0">
+                          <a:effectLst/>
+                        </a:rPr>
+                        <a:t>Criar base de </a:t>
+                      </a:r>
+                      <a:r>
+                        <a:rPr lang="pt-BR" sz="1100" u="none" strike="noStrike" dirty="0" smtClean="0">
+                          <a:effectLst/>
+                        </a:rPr>
+                        <a:t>dados</a:t>
+                      </a:r>
+                      <a:r>
+                        <a:rPr lang="pt-BR" sz="1100" u="none" strike="noStrike" baseline="0" dirty="0" smtClean="0">
+                          <a:effectLst/>
+                        </a:rPr>
+                        <a:t> de trafego. </a:t>
+                      </a:r>
+                      <a:endParaRPr lang="pt-BR" sz="1100" b="0" i="0" u="none" strike="noStrike" dirty="0">
+                        <a:solidFill>
+                          <a:srgbClr val="000000"/>
+                        </a:solidFill>
+                        <a:effectLst/>
+                        <a:latin typeface="Calibri"/>
+                      </a:endParaRPr>
+                    </a:p>
+                  </a:txBody>
+                  <a:tcPr marL="9183" marR="9183" marT="9183" marB="0" anchor="ctr"/>
+                </a:tc>
+              </a:tr>
+              <a:tr h="226668">
+                <a:tc>
+                  <a:txBody>
+                    <a:bodyPr/>
+                    <a:lstStyle/>
+                    <a:p>
+                      <a:pPr algn="ctr" fontAlgn="b"/>
+                      <a:r>
+                        <a:rPr lang="pt-BR" sz="1100" u="none" strike="noStrike" dirty="0">
+                          <a:effectLst/>
+                        </a:rPr>
+                        <a:t>3</a:t>
+                      </a:r>
+                      <a:endParaRPr lang="pt-BR" sz="1100" b="0" i="0" u="none" strike="noStrike" dirty="0">
+                        <a:solidFill>
+                          <a:srgbClr val="000000"/>
+                        </a:solidFill>
+                        <a:effectLst/>
+                        <a:latin typeface="Calibri"/>
+                      </a:endParaRPr>
+                    </a:p>
+                  </a:txBody>
+                  <a:tcPr marL="9183" marR="9183" marT="9183" marB="0" anchor="ctr"/>
+                </a:tc>
+                <a:tc>
+                  <a:txBody>
+                    <a:bodyPr/>
+                    <a:lstStyle/>
+                    <a:p>
+                      <a:pPr algn="l" fontAlgn="b"/>
+                      <a:r>
+                        <a:rPr lang="pt-BR" sz="1100" u="none" strike="noStrike" dirty="0">
+                          <a:effectLst/>
+                        </a:rPr>
+                        <a:t>Implementar na aplicação de log de trafego um sistema de redes neurais</a:t>
+                      </a:r>
+                      <a:endParaRPr lang="pt-BR" sz="1100" b="0" i="0" u="none" strike="noStrike" dirty="0">
+                        <a:solidFill>
+                          <a:srgbClr val="000000"/>
+                        </a:solidFill>
+                        <a:effectLst/>
+                        <a:latin typeface="Calibri"/>
+                      </a:endParaRPr>
+                    </a:p>
+                  </a:txBody>
+                  <a:tcPr marL="9183" marR="9183" marT="9183" marB="0" anchor="ctr"/>
+                </a:tc>
+              </a:tr>
+              <a:tr h="295275">
+                <a:tc>
+                  <a:txBody>
+                    <a:bodyPr/>
+                    <a:lstStyle/>
+                    <a:p>
+                      <a:pPr algn="ctr" fontAlgn="b"/>
+                      <a:r>
+                        <a:rPr lang="pt-BR" sz="1100" u="none" strike="noStrike" dirty="0">
+                          <a:effectLst/>
+                        </a:rPr>
+                        <a:t>4</a:t>
+                      </a:r>
+                      <a:endParaRPr lang="pt-BR" sz="1100" b="0" i="0" u="none" strike="noStrike" dirty="0">
+                        <a:solidFill>
+                          <a:srgbClr val="000000"/>
+                        </a:solidFill>
+                        <a:effectLst/>
+                        <a:latin typeface="Calibri"/>
+                      </a:endParaRPr>
+                    </a:p>
+                  </a:txBody>
+                  <a:tcPr marL="9183" marR="9183" marT="9183" marB="0" anchor="ctr"/>
+                </a:tc>
+                <a:tc>
+                  <a:txBody>
+                    <a:bodyPr/>
+                    <a:lstStyle/>
+                    <a:p>
+                      <a:pPr algn="l" fontAlgn="b"/>
+                      <a:r>
+                        <a:rPr lang="pt-BR" sz="1100" u="none" strike="noStrike" dirty="0">
+                          <a:effectLst/>
+                        </a:rPr>
+                        <a:t>Realizar treinamento da RNA da aplicação com os datasets KDD’99 e o modelado para o projeto</a:t>
+                      </a:r>
+                      <a:endParaRPr lang="pt-BR" sz="1100" b="0" i="0" u="none" strike="noStrike" dirty="0">
+                        <a:solidFill>
+                          <a:srgbClr val="000000"/>
+                        </a:solidFill>
+                        <a:effectLst/>
+                        <a:latin typeface="Calibri"/>
+                      </a:endParaRPr>
+                    </a:p>
+                  </a:txBody>
+                  <a:tcPr marL="9183" marR="9183" marT="9183" marB="0" anchor="ctr"/>
+                </a:tc>
+              </a:tr>
+              <a:tr h="238125">
+                <a:tc>
+                  <a:txBody>
+                    <a:bodyPr/>
+                    <a:lstStyle/>
+                    <a:p>
+                      <a:pPr algn="ctr" fontAlgn="b"/>
+                      <a:r>
+                        <a:rPr lang="pt-BR" sz="1100" u="none" strike="noStrike" dirty="0">
+                          <a:effectLst/>
+                        </a:rPr>
+                        <a:t>5</a:t>
+                      </a:r>
+                      <a:endParaRPr lang="pt-BR" sz="1100" b="0" i="0" u="none" strike="noStrike" dirty="0">
+                        <a:solidFill>
+                          <a:srgbClr val="000000"/>
+                        </a:solidFill>
+                        <a:effectLst/>
+                        <a:latin typeface="Calibri"/>
+                      </a:endParaRPr>
+                    </a:p>
+                  </a:txBody>
+                  <a:tcPr marL="9183" marR="9183" marT="9183" marB="0" anchor="ctr"/>
+                </a:tc>
+                <a:tc>
+                  <a:txBody>
+                    <a:bodyPr/>
+                    <a:lstStyle/>
+                    <a:p>
+                      <a:pPr algn="l" fontAlgn="b"/>
+                      <a:r>
+                        <a:rPr lang="pt-BR" sz="1100" u="none" strike="noStrike">
+                          <a:effectLst/>
+                        </a:rPr>
+                        <a:t>Mensurar resultados da aplicação do modelo </a:t>
+                      </a:r>
+                      <a:endParaRPr lang="pt-BR" sz="1100" b="0" i="0" u="none" strike="noStrike">
+                        <a:solidFill>
+                          <a:srgbClr val="000000"/>
+                        </a:solidFill>
+                        <a:effectLst/>
+                        <a:latin typeface="Calibri"/>
+                      </a:endParaRPr>
+                    </a:p>
+                  </a:txBody>
+                  <a:tcPr marL="9183" marR="9183" marT="9183" marB="0" anchor="ctr"/>
+                </a:tc>
+              </a:tr>
+              <a:tr h="354185">
+                <a:tc>
+                  <a:txBody>
+                    <a:bodyPr/>
+                    <a:lstStyle/>
+                    <a:p>
+                      <a:pPr algn="ctr" fontAlgn="b"/>
+                      <a:r>
+                        <a:rPr lang="pt-BR" sz="1100" u="none" strike="noStrike" dirty="0">
+                          <a:effectLst/>
+                        </a:rPr>
+                        <a:t>6</a:t>
+                      </a:r>
+                      <a:endParaRPr lang="pt-BR" sz="1100" b="0" i="0" u="none" strike="noStrike" dirty="0">
+                        <a:solidFill>
+                          <a:srgbClr val="000000"/>
+                        </a:solidFill>
+                        <a:effectLst/>
+                        <a:latin typeface="Calibri"/>
+                      </a:endParaRPr>
+                    </a:p>
+                  </a:txBody>
+                  <a:tcPr marL="9183" marR="9183" marT="9183" marB="0" anchor="ctr"/>
+                </a:tc>
+                <a:tc>
+                  <a:txBody>
+                    <a:bodyPr/>
+                    <a:lstStyle/>
+                    <a:p>
+                      <a:pPr algn="l" fontAlgn="b"/>
+                      <a:r>
+                        <a:rPr lang="pt-BR" sz="1100" u="none" strike="noStrike" dirty="0">
+                          <a:effectLst/>
+                        </a:rPr>
+                        <a:t>Comparar com os resultados obtidos por outros IDS baseados em RNA</a:t>
+                      </a:r>
+                      <a:endParaRPr lang="pt-BR" sz="1100" b="0" i="0" u="none" strike="noStrike" dirty="0">
+                        <a:solidFill>
+                          <a:srgbClr val="000000"/>
+                        </a:solidFill>
+                        <a:effectLst/>
+                        <a:latin typeface="Calibri"/>
+                      </a:endParaRPr>
+                    </a:p>
+                  </a:txBody>
+                  <a:tcPr marL="9183" marR="9183" marT="9183" marB="0" anchor="ctr"/>
+                </a:tc>
+              </a:tr>
+              <a:tr h="288596">
+                <a:tc>
+                  <a:txBody>
+                    <a:bodyPr/>
+                    <a:lstStyle/>
+                    <a:p>
+                      <a:pPr algn="ctr" fontAlgn="b"/>
+                      <a:r>
+                        <a:rPr lang="pt-BR" sz="1100" u="none" strike="noStrike" dirty="0">
+                          <a:effectLst/>
+                        </a:rPr>
+                        <a:t>7</a:t>
+                      </a:r>
+                      <a:endParaRPr lang="pt-BR" sz="1100" b="0" i="0" u="none" strike="noStrike" dirty="0">
+                        <a:solidFill>
+                          <a:srgbClr val="000000"/>
+                        </a:solidFill>
+                        <a:effectLst/>
+                        <a:latin typeface="Calibri"/>
+                      </a:endParaRPr>
+                    </a:p>
+                  </a:txBody>
+                  <a:tcPr marL="9183" marR="9183" marT="9183" marB="0" anchor="ctr"/>
+                </a:tc>
+                <a:tc>
+                  <a:txBody>
+                    <a:bodyPr/>
+                    <a:lstStyle/>
+                    <a:p>
+                      <a:pPr algn="l" fontAlgn="b"/>
+                      <a:r>
+                        <a:rPr lang="pt-BR" sz="1100" u="none" strike="noStrike">
+                          <a:effectLst/>
+                        </a:rPr>
+                        <a:t>Analisar se é possível  aprimorar os resultados do modelo</a:t>
+                      </a:r>
+                      <a:endParaRPr lang="pt-BR" sz="1100" b="0" i="0" u="none" strike="noStrike">
+                        <a:solidFill>
+                          <a:srgbClr val="000000"/>
+                        </a:solidFill>
+                        <a:effectLst/>
+                        <a:latin typeface="Calibri"/>
+                      </a:endParaRPr>
+                    </a:p>
+                  </a:txBody>
+                  <a:tcPr marL="9183" marR="9183" marT="9183" marB="0" anchor="ctr"/>
+                </a:tc>
+              </a:tr>
+              <a:tr h="301713">
+                <a:tc>
+                  <a:txBody>
+                    <a:bodyPr/>
+                    <a:lstStyle/>
+                    <a:p>
+                      <a:pPr algn="ctr" fontAlgn="b"/>
+                      <a:r>
+                        <a:rPr lang="pt-BR" sz="1100" u="none" strike="noStrike" dirty="0">
+                          <a:effectLst/>
+                        </a:rPr>
+                        <a:t>8</a:t>
+                      </a:r>
+                      <a:endParaRPr lang="pt-BR" sz="1100" b="0" i="0" u="none" strike="noStrike" dirty="0">
+                        <a:solidFill>
+                          <a:srgbClr val="000000"/>
+                        </a:solidFill>
+                        <a:effectLst/>
+                        <a:latin typeface="Calibri"/>
+                      </a:endParaRPr>
+                    </a:p>
+                  </a:txBody>
+                  <a:tcPr marL="9183" marR="9183" marT="9183" marB="0" anchor="ctr"/>
+                </a:tc>
+                <a:tc>
+                  <a:txBody>
+                    <a:bodyPr/>
+                    <a:lstStyle/>
+                    <a:p>
+                      <a:pPr algn="l" fontAlgn="b"/>
+                      <a:r>
+                        <a:rPr lang="pt-BR" sz="1100" u="none" strike="noStrike">
+                          <a:effectLst/>
+                        </a:rPr>
+                        <a:t>Implementar o modelo de POLVO-IIDS</a:t>
+                      </a:r>
+                      <a:endParaRPr lang="pt-BR" sz="1100" b="0" i="0" u="none" strike="noStrike">
+                        <a:solidFill>
+                          <a:srgbClr val="000000"/>
+                        </a:solidFill>
+                        <a:effectLst/>
+                        <a:latin typeface="Calibri"/>
+                      </a:endParaRPr>
+                    </a:p>
+                  </a:txBody>
+                  <a:tcPr marL="9183" marR="9183" marT="9183" marB="0" anchor="ctr"/>
+                </a:tc>
+              </a:tr>
+              <a:tr h="301713">
+                <a:tc>
+                  <a:txBody>
+                    <a:bodyPr/>
+                    <a:lstStyle/>
+                    <a:p>
+                      <a:pPr algn="ctr" fontAlgn="b"/>
+                      <a:r>
+                        <a:rPr lang="pt-BR" sz="1100" u="none" strike="noStrike">
+                          <a:effectLst/>
+                        </a:rPr>
+                        <a:t>9</a:t>
+                      </a:r>
+                      <a:endParaRPr lang="pt-BR" sz="1100" b="0" i="0" u="none" strike="noStrike">
+                        <a:solidFill>
+                          <a:srgbClr val="000000"/>
+                        </a:solidFill>
+                        <a:effectLst/>
+                        <a:latin typeface="Calibri"/>
+                      </a:endParaRPr>
+                    </a:p>
+                  </a:txBody>
+                  <a:tcPr marL="9183" marR="9183" marT="9183" marB="0" anchor="ctr"/>
+                </a:tc>
+                <a:tc>
+                  <a:txBody>
+                    <a:bodyPr/>
+                    <a:lstStyle/>
+                    <a:p>
+                      <a:pPr algn="l" fontAlgn="b"/>
+                      <a:r>
+                        <a:rPr lang="pt-BR" sz="1100" u="none" strike="noStrike" dirty="0">
+                          <a:effectLst/>
+                        </a:rPr>
+                        <a:t>Comparar com os resultados obtidos anteriormente </a:t>
+                      </a:r>
+                      <a:endParaRPr lang="pt-BR" sz="1100" b="0" i="0" u="none" strike="noStrike" dirty="0">
+                        <a:solidFill>
+                          <a:srgbClr val="000000"/>
+                        </a:solidFill>
+                        <a:effectLst/>
+                        <a:latin typeface="Calibri"/>
+                      </a:endParaRPr>
+                    </a:p>
+                  </a:txBody>
+                  <a:tcPr marL="9183" marR="9183" marT="9183" marB="0" anchor="ctr"/>
+                </a:tc>
+              </a:tr>
+              <a:tr h="314831">
+                <a:tc>
+                  <a:txBody>
+                    <a:bodyPr/>
+                    <a:lstStyle/>
+                    <a:p>
+                      <a:pPr algn="ctr" fontAlgn="b"/>
+                      <a:r>
+                        <a:rPr lang="pt-BR" sz="1100" u="none" strike="noStrike">
+                          <a:effectLst/>
+                        </a:rPr>
+                        <a:t>10</a:t>
+                      </a:r>
+                      <a:endParaRPr lang="pt-BR" sz="1100" b="0" i="0" u="none" strike="noStrike">
+                        <a:solidFill>
+                          <a:srgbClr val="000000"/>
+                        </a:solidFill>
+                        <a:effectLst/>
+                        <a:latin typeface="Calibri"/>
+                      </a:endParaRPr>
+                    </a:p>
+                  </a:txBody>
+                  <a:tcPr marL="9183" marR="9183" marT="9183" marB="0" anchor="ctr"/>
+                </a:tc>
+                <a:tc>
+                  <a:txBody>
+                    <a:bodyPr/>
+                    <a:lstStyle/>
+                    <a:p>
+                      <a:pPr algn="l" fontAlgn="b"/>
+                      <a:r>
+                        <a:rPr lang="pt-BR" sz="1100" u="none" strike="noStrike" dirty="0">
+                          <a:effectLst/>
+                        </a:rPr>
+                        <a:t>Implementar RNA clusterizado.</a:t>
+                      </a:r>
+                      <a:endParaRPr lang="pt-BR" sz="1100" b="0" i="0" u="none" strike="noStrike" dirty="0">
+                        <a:solidFill>
+                          <a:srgbClr val="000000"/>
+                        </a:solidFill>
+                        <a:effectLst/>
+                        <a:latin typeface="Calibri"/>
+                      </a:endParaRPr>
+                    </a:p>
+                  </a:txBody>
+                  <a:tcPr marL="9183" marR="9183" marT="9183" marB="0" anchor="ctr"/>
+                </a:tc>
+              </a:tr>
+              <a:tr h="327948">
+                <a:tc>
+                  <a:txBody>
+                    <a:bodyPr/>
+                    <a:lstStyle/>
+                    <a:p>
+                      <a:pPr algn="ctr" fontAlgn="b"/>
+                      <a:r>
+                        <a:rPr lang="pt-BR" sz="1100" u="none" strike="noStrike">
+                          <a:effectLst/>
+                        </a:rPr>
+                        <a:t>11</a:t>
+                      </a:r>
+                      <a:endParaRPr lang="pt-BR" sz="1100" b="0" i="0" u="none" strike="noStrike">
+                        <a:solidFill>
+                          <a:srgbClr val="000000"/>
+                        </a:solidFill>
+                        <a:effectLst/>
+                        <a:latin typeface="Calibri"/>
+                      </a:endParaRPr>
+                    </a:p>
+                  </a:txBody>
+                  <a:tcPr marL="9183" marR="9183" marT="9183" marB="0" anchor="ctr"/>
+                </a:tc>
+                <a:tc>
+                  <a:txBody>
+                    <a:bodyPr/>
+                    <a:lstStyle/>
+                    <a:p>
+                      <a:pPr algn="l" fontAlgn="b"/>
+                      <a:r>
+                        <a:rPr lang="pt-BR" sz="1100" u="none" strike="noStrike">
+                          <a:effectLst/>
+                        </a:rPr>
+                        <a:t>Comparar com os resultados obtidos anteriormente </a:t>
+                      </a:r>
+                      <a:endParaRPr lang="pt-BR" sz="1100" b="0" i="0" u="none" strike="noStrike">
+                        <a:solidFill>
+                          <a:srgbClr val="000000"/>
+                        </a:solidFill>
+                        <a:effectLst/>
+                        <a:latin typeface="Calibri"/>
+                      </a:endParaRPr>
+                    </a:p>
+                  </a:txBody>
+                  <a:tcPr marL="9183" marR="9183" marT="9183" marB="0" anchor="ctr"/>
+                </a:tc>
+              </a:tr>
+              <a:tr h="288596">
+                <a:tc>
+                  <a:txBody>
+                    <a:bodyPr/>
+                    <a:lstStyle/>
+                    <a:p>
+                      <a:pPr algn="ctr" fontAlgn="b"/>
+                      <a:r>
+                        <a:rPr lang="pt-BR" sz="1100" u="none" strike="noStrike">
+                          <a:effectLst/>
+                        </a:rPr>
+                        <a:t>12</a:t>
+                      </a:r>
+                      <a:endParaRPr lang="pt-BR" sz="1100" b="0" i="0" u="none" strike="noStrike">
+                        <a:solidFill>
+                          <a:srgbClr val="000000"/>
+                        </a:solidFill>
+                        <a:effectLst/>
+                        <a:latin typeface="Calibri"/>
+                      </a:endParaRPr>
+                    </a:p>
+                  </a:txBody>
+                  <a:tcPr marL="9183" marR="9183" marT="9183" marB="0" anchor="ctr"/>
+                </a:tc>
+                <a:tc>
+                  <a:txBody>
+                    <a:bodyPr/>
+                    <a:lstStyle/>
+                    <a:p>
+                      <a:pPr algn="l" fontAlgn="b"/>
+                      <a:r>
+                        <a:rPr lang="pt-BR" sz="1100" u="none" strike="noStrike" dirty="0">
+                          <a:effectLst/>
+                        </a:rPr>
+                        <a:t>Implementar modelo hibrido POLVO-IIDS Clusterizado</a:t>
+                      </a:r>
+                      <a:endParaRPr lang="pt-BR" sz="1100" b="0" i="0" u="none" strike="noStrike" dirty="0">
+                        <a:solidFill>
+                          <a:srgbClr val="000000"/>
+                        </a:solidFill>
+                        <a:effectLst/>
+                        <a:latin typeface="Calibri"/>
+                      </a:endParaRPr>
+                    </a:p>
+                  </a:txBody>
+                  <a:tcPr marL="9183" marR="9183" marT="9183" marB="0" anchor="ctr"/>
+                </a:tc>
+              </a:tr>
+              <a:tr h="314831">
+                <a:tc>
+                  <a:txBody>
+                    <a:bodyPr/>
+                    <a:lstStyle/>
+                    <a:p>
+                      <a:pPr algn="ctr" fontAlgn="b"/>
+                      <a:r>
+                        <a:rPr lang="pt-BR" sz="1100" u="none" strike="noStrike" dirty="0">
+                          <a:effectLst/>
+                        </a:rPr>
+                        <a:t>13</a:t>
+                      </a:r>
+                      <a:endParaRPr lang="pt-BR" sz="1100" b="0" i="0" u="none" strike="noStrike" dirty="0">
+                        <a:solidFill>
+                          <a:srgbClr val="000000"/>
+                        </a:solidFill>
+                        <a:effectLst/>
+                        <a:latin typeface="Calibri"/>
+                      </a:endParaRPr>
+                    </a:p>
+                  </a:txBody>
+                  <a:tcPr marL="9183" marR="9183" marT="9183" marB="0" anchor="ctr"/>
+                </a:tc>
+                <a:tc>
+                  <a:txBody>
+                    <a:bodyPr/>
+                    <a:lstStyle/>
+                    <a:p>
+                      <a:pPr algn="l" fontAlgn="b"/>
+                      <a:r>
+                        <a:rPr lang="pt-BR" sz="1100" u="none" strike="noStrike" dirty="0">
+                          <a:effectLst/>
+                        </a:rPr>
+                        <a:t>Comparar com os resultados obtidos anteriormente </a:t>
+                      </a:r>
+                      <a:endParaRPr lang="pt-BR" sz="1100" b="0" i="0" u="none" strike="noStrike" dirty="0">
+                        <a:solidFill>
+                          <a:srgbClr val="000000"/>
+                        </a:solidFill>
+                        <a:effectLst/>
+                        <a:latin typeface="Calibri"/>
+                      </a:endParaRPr>
+                    </a:p>
+                  </a:txBody>
+                  <a:tcPr marL="9183" marR="9183" marT="9183" marB="0" anchor="ctr"/>
+                </a:tc>
+              </a:tr>
+              <a:tr h="301713">
+                <a:tc>
+                  <a:txBody>
+                    <a:bodyPr/>
+                    <a:lstStyle/>
+                    <a:p>
+                      <a:pPr algn="ctr" fontAlgn="b"/>
+                      <a:r>
+                        <a:rPr lang="pt-BR" sz="1100" u="none" strike="noStrike" dirty="0">
+                          <a:effectLst/>
+                        </a:rPr>
+                        <a:t>14</a:t>
+                      </a:r>
+                      <a:endParaRPr lang="pt-BR" sz="1100" b="0" i="0" u="none" strike="noStrike" dirty="0">
+                        <a:solidFill>
+                          <a:srgbClr val="000000"/>
+                        </a:solidFill>
+                        <a:effectLst/>
+                        <a:latin typeface="Calibri"/>
+                      </a:endParaRPr>
+                    </a:p>
+                  </a:txBody>
+                  <a:tcPr marL="9183" marR="9183" marT="9183" marB="0" anchor="ctr"/>
+                </a:tc>
+                <a:tc>
+                  <a:txBody>
+                    <a:bodyPr/>
+                    <a:lstStyle/>
+                    <a:p>
+                      <a:pPr algn="l" fontAlgn="b"/>
+                      <a:r>
+                        <a:rPr lang="pt-BR" sz="1100" u="none" strike="noStrike">
+                          <a:effectLst/>
+                        </a:rPr>
+                        <a:t>Trabalhar na monografia - desenvolvimento</a:t>
+                      </a:r>
+                      <a:endParaRPr lang="pt-BR" sz="1100" b="0" i="0" u="none" strike="noStrike">
+                        <a:solidFill>
+                          <a:srgbClr val="000000"/>
+                        </a:solidFill>
+                        <a:effectLst/>
+                        <a:latin typeface="Calibri"/>
+                      </a:endParaRPr>
+                    </a:p>
+                  </a:txBody>
+                  <a:tcPr marL="9183" marR="9183" marT="9183" marB="0" anchor="ctr"/>
+                </a:tc>
+              </a:tr>
+              <a:tr h="245174">
+                <a:tc>
+                  <a:txBody>
+                    <a:bodyPr/>
+                    <a:lstStyle/>
+                    <a:p>
+                      <a:pPr algn="ctr" fontAlgn="b"/>
+                      <a:r>
+                        <a:rPr lang="pt-BR" sz="1100" u="none" strike="noStrike" dirty="0">
+                          <a:effectLst/>
+                        </a:rPr>
+                        <a:t>15</a:t>
+                      </a:r>
+                      <a:endParaRPr lang="pt-BR" sz="1100" b="0" i="0" u="none" strike="noStrike" dirty="0">
+                        <a:solidFill>
+                          <a:srgbClr val="000000"/>
+                        </a:solidFill>
+                        <a:effectLst/>
+                        <a:latin typeface="Calibri"/>
+                      </a:endParaRPr>
+                    </a:p>
+                  </a:txBody>
+                  <a:tcPr marL="9183" marR="9183" marT="9183" marB="0" anchor="ctr"/>
+                </a:tc>
+                <a:tc>
+                  <a:txBody>
+                    <a:bodyPr/>
+                    <a:lstStyle/>
+                    <a:p>
+                      <a:pPr algn="l" fontAlgn="b"/>
+                      <a:r>
+                        <a:rPr lang="pt-BR" sz="1100" u="none" strike="noStrike" dirty="0">
+                          <a:effectLst/>
+                        </a:rPr>
+                        <a:t>Trabalhar na monografia - resultados</a:t>
+                      </a:r>
+                      <a:endParaRPr lang="pt-BR" sz="1100" b="0" i="0" u="none" strike="noStrike" dirty="0">
+                        <a:solidFill>
+                          <a:srgbClr val="000000"/>
+                        </a:solidFill>
+                        <a:effectLst/>
+                        <a:latin typeface="Calibri"/>
+                      </a:endParaRPr>
+                    </a:p>
+                  </a:txBody>
+                  <a:tcPr marL="9183" marR="9183" marT="9183" marB="0" anchor="ctr"/>
+                </a:tc>
+              </a:tr>
+            </a:tbl>
+          </a:graphicData>
+        </a:graphic>
+      </p:graphicFrame>
+      <p:graphicFrame>
+        <p:nvGraphicFramePr>
+          <p:cNvPr id="4" name="Table 3"/>
+          <p:cNvGraphicFramePr>
+            <a:graphicFrameLocks noGrp="1"/>
+          </p:cNvGraphicFramePr>
+          <p:nvPr>
+            <p:extLst>
+              <p:ext uri="{D42A27DB-BD31-4B8C-83A1-F6EECF244321}">
+                <p14:modId xmlns:p14="http://schemas.microsoft.com/office/powerpoint/2010/main" val="2758640948"/>
+              </p:ext>
+            </p:extLst>
+          </p:nvPr>
+        </p:nvGraphicFramePr>
+        <p:xfrm>
+          <a:off x="247649" y="5756447"/>
+          <a:ext cx="8852105" cy="672928"/>
+        </p:xfrm>
+        <a:graphic>
+          <a:graphicData uri="http://schemas.openxmlformats.org/drawingml/2006/table">
+            <a:tbl>
+              <a:tblPr>
+                <a:tableStyleId>{5C22544A-7EE6-4342-B048-85BDC9FD1C3A}</a:tableStyleId>
+              </a:tblPr>
+              <a:tblGrid>
+                <a:gridCol w="838201"/>
+                <a:gridCol w="8013904"/>
+              </a:tblGrid>
+              <a:tr h="234778">
+                <a:tc>
+                  <a:txBody>
+                    <a:bodyPr/>
+                    <a:lstStyle/>
+                    <a:p>
+                      <a:pPr algn="ctr" fontAlgn="b"/>
+                      <a:r>
+                        <a:rPr lang="pt-BR" sz="1100" u="none" strike="noStrike" dirty="0">
+                          <a:effectLst/>
+                        </a:rPr>
+                        <a:t>16</a:t>
+                      </a:r>
+                      <a:endParaRPr lang="pt-BR" sz="1100" b="0" i="0" u="none" strike="noStrike" dirty="0">
+                        <a:solidFill>
+                          <a:srgbClr val="000000"/>
+                        </a:solidFill>
+                        <a:effectLst/>
+                        <a:latin typeface="Calibri"/>
+                      </a:endParaRPr>
+                    </a:p>
+                  </a:txBody>
+                  <a:tcPr marL="9183" marR="9183" marT="9183" marB="0" anchor="ctr"/>
+                </a:tc>
+                <a:tc>
+                  <a:txBody>
+                    <a:bodyPr/>
+                    <a:lstStyle/>
+                    <a:p>
+                      <a:pPr algn="l" fontAlgn="b"/>
+                      <a:r>
+                        <a:rPr lang="pt-BR" sz="1100" u="none" strike="noStrike" dirty="0">
+                          <a:effectLst/>
+                        </a:rPr>
+                        <a:t>Trabalhar na monografia - resultados</a:t>
+                      </a:r>
+                      <a:endParaRPr lang="pt-BR" sz="1100" b="0" i="0" u="none" strike="noStrike" dirty="0">
+                        <a:solidFill>
+                          <a:srgbClr val="000000"/>
+                        </a:solidFill>
+                        <a:effectLst/>
+                        <a:latin typeface="Calibri"/>
+                      </a:endParaRPr>
+                    </a:p>
+                  </a:txBody>
+                  <a:tcPr marL="9183" marR="9183" marT="9183" marB="0" anchor="ctr"/>
+                </a:tc>
+              </a:tr>
+              <a:tr h="228600">
+                <a:tc>
+                  <a:txBody>
+                    <a:bodyPr/>
+                    <a:lstStyle/>
+                    <a:p>
+                      <a:pPr algn="ctr" fontAlgn="b"/>
+                      <a:r>
+                        <a:rPr lang="pt-BR" sz="1100" u="none" strike="noStrike">
+                          <a:effectLst/>
+                        </a:rPr>
+                        <a:t>17</a:t>
+                      </a:r>
+                      <a:endParaRPr lang="pt-BR" sz="1100" b="0" i="0" u="none" strike="noStrike">
+                        <a:solidFill>
+                          <a:srgbClr val="000000"/>
+                        </a:solidFill>
+                        <a:effectLst/>
+                        <a:latin typeface="Calibri"/>
+                      </a:endParaRPr>
+                    </a:p>
+                  </a:txBody>
+                  <a:tcPr marL="9183" marR="9183" marT="9183" marB="0" anchor="ctr"/>
+                </a:tc>
+                <a:tc>
+                  <a:txBody>
+                    <a:bodyPr/>
+                    <a:lstStyle/>
+                    <a:p>
+                      <a:pPr algn="l" fontAlgn="b"/>
+                      <a:r>
+                        <a:rPr lang="pt-BR" sz="1100" u="none" strike="noStrike" dirty="0">
+                          <a:effectLst/>
+                        </a:rPr>
+                        <a:t>Trabalhar na monografia - resultados</a:t>
+                      </a:r>
+                      <a:endParaRPr lang="pt-BR" sz="1100" b="0" i="0" u="none" strike="noStrike" dirty="0">
+                        <a:solidFill>
+                          <a:srgbClr val="000000"/>
+                        </a:solidFill>
+                        <a:effectLst/>
+                        <a:latin typeface="Calibri"/>
+                      </a:endParaRPr>
+                    </a:p>
+                  </a:txBody>
+                  <a:tcPr marL="9183" marR="9183" marT="9183" marB="0" anchor="ctr"/>
+                </a:tc>
+              </a:tr>
+              <a:tr h="209550">
+                <a:tc>
+                  <a:txBody>
+                    <a:bodyPr/>
+                    <a:lstStyle/>
+                    <a:p>
+                      <a:pPr algn="ctr" fontAlgn="b"/>
+                      <a:r>
+                        <a:rPr lang="pt-BR" sz="1100" u="none" strike="noStrike">
+                          <a:effectLst/>
+                        </a:rPr>
+                        <a:t>18</a:t>
+                      </a:r>
+                      <a:endParaRPr lang="pt-BR" sz="1100" b="0" i="0" u="none" strike="noStrike">
+                        <a:solidFill>
+                          <a:srgbClr val="000000"/>
+                        </a:solidFill>
+                        <a:effectLst/>
+                        <a:latin typeface="Calibri"/>
+                      </a:endParaRPr>
+                    </a:p>
+                  </a:txBody>
+                  <a:tcPr marL="9183" marR="9183" marT="9183" marB="0" anchor="ctr"/>
+                </a:tc>
+                <a:tc>
+                  <a:txBody>
+                    <a:bodyPr/>
+                    <a:lstStyle/>
+                    <a:p>
+                      <a:pPr algn="l" fontAlgn="b"/>
+                      <a:r>
+                        <a:rPr lang="pt-BR" sz="1100" u="none" strike="noStrike" dirty="0">
+                          <a:effectLst/>
+                        </a:rPr>
+                        <a:t>Apresentação dos resultados</a:t>
+                      </a:r>
+                      <a:endParaRPr lang="pt-BR" sz="1100" b="0" i="0" u="none" strike="noStrike" dirty="0">
+                        <a:solidFill>
+                          <a:srgbClr val="000000"/>
+                        </a:solidFill>
+                        <a:effectLst/>
+                        <a:latin typeface="Calibri"/>
+                      </a:endParaRPr>
+                    </a:p>
+                  </a:txBody>
+                  <a:tcPr marL="9183" marR="9183" marT="9183" marB="0" anchor="ctr"/>
+                </a:tc>
+              </a:tr>
+            </a:tbl>
+          </a:graphicData>
+        </a:graphic>
+      </p:graphicFrame>
     </p:spTree>
     <p:extLst>
       <p:ext uri="{BB962C8B-B14F-4D97-AF65-F5344CB8AC3E}">
@@ -9383,11 +10351,6 @@
               </a:rPr>
               <a:t>16. Agradecimentos</a:t>
             </a:r>
-            <a:endParaRPr lang="pt-BR" sz="1400" dirty="0">
-              <a:solidFill>
-                <a:schemeClr val="tx1"/>
-              </a:solidFill>
-            </a:endParaRPr>
           </a:p>
         </p:txBody>
       </p:sp>
@@ -10767,11 +11730,6 @@
               </a:rPr>
               <a:t>16. Agradecimentos</a:t>
             </a:r>
-            <a:endParaRPr lang="pt-BR" sz="1400" dirty="0">
-              <a:solidFill>
-                <a:schemeClr val="tx1"/>
-              </a:solidFill>
-            </a:endParaRPr>
           </a:p>
         </p:txBody>
       </p:sp>
@@ -11340,11 +12298,6 @@
               </a:rPr>
               <a:t>16. Agradecimentos</a:t>
             </a:r>
-            <a:endParaRPr lang="pt-BR" sz="1400" dirty="0">
-              <a:solidFill>
-                <a:schemeClr val="tx1"/>
-              </a:solidFill>
-            </a:endParaRPr>
           </a:p>
         </p:txBody>
       </p:sp>
@@ -11980,14 +12933,6 @@
               </a:rPr>
               <a:t>16. Agradecimentos</a:t>
             </a:r>
-            <a:endParaRPr lang="pt-BR" sz="1400" dirty="0">
-              <a:solidFill>
-                <a:schemeClr val="bg2">
-                  <a:lumMod val="40000"/>
-                  <a:lumOff val="60000"/>
-                </a:schemeClr>
-              </a:solidFill>
-            </a:endParaRPr>
           </a:p>
         </p:txBody>
       </p:sp>
@@ -12586,15 +13531,7 @@
                   <a:schemeClr val="tx1"/>
                 </a:solidFill>
               </a:rPr>
-              <a:t>11. </a:t>
-            </a:r>
-            <a:r>
-              <a:rPr lang="pt-BR" sz="1400" dirty="0" smtClean="0">
-                <a:solidFill>
-                  <a:schemeClr val="tx1"/>
-                </a:solidFill>
-              </a:rPr>
-              <a:t>Objetivo</a:t>
+              <a:t>11. Objetivo</a:t>
             </a:r>
           </a:p>
           <a:p>
@@ -13400,11 +14337,6 @@
               </a:rPr>
               <a:t>16. Agradecimentos</a:t>
             </a:r>
-            <a:endParaRPr lang="pt-BR" sz="1400" dirty="0">
-              <a:solidFill>
-                <a:schemeClr val="tx1"/>
-              </a:solidFill>
-            </a:endParaRPr>
           </a:p>
         </p:txBody>
       </p:sp>
@@ -14082,11 +15014,6 @@
               </a:rPr>
               <a:t>16. Agradecimentos</a:t>
             </a:r>
-            <a:endParaRPr lang="pt-BR" sz="1400" dirty="0">
-              <a:solidFill>
-                <a:schemeClr val="tx1"/>
-              </a:solidFill>
-            </a:endParaRPr>
           </a:p>
         </p:txBody>
       </p:sp>
@@ -14744,11 +15671,6 @@
               </a:rPr>
               <a:t>16. Agradecimentos</a:t>
             </a:r>
-            <a:endParaRPr lang="pt-BR" sz="1400" dirty="0">
-              <a:solidFill>
-                <a:schemeClr val="tx1"/>
-              </a:solidFill>
-            </a:endParaRPr>
           </a:p>
         </p:txBody>
       </p:sp>
@@ -15402,11 +16324,6 @@
               </a:rPr>
               <a:t>16. Agradecimentos</a:t>
             </a:r>
-            <a:endParaRPr lang="pt-BR" sz="1400" dirty="0">
-              <a:solidFill>
-                <a:schemeClr val="tx1"/>
-              </a:solidFill>
-            </a:endParaRPr>
           </a:p>
         </p:txBody>
       </p:sp>
@@ -16127,11 +17044,6 @@
               </a:rPr>
               <a:t>16. Agradecimentos</a:t>
             </a:r>
-            <a:endParaRPr lang="pt-BR" sz="1400" dirty="0">
-              <a:solidFill>
-                <a:schemeClr val="tx1"/>
-              </a:solidFill>
-            </a:endParaRPr>
           </a:p>
         </p:txBody>
       </p:sp>
@@ -16794,11 +17706,6 @@
               </a:rPr>
               <a:t>16. Agradecimentos</a:t>
             </a:r>
-            <a:endParaRPr lang="pt-BR" sz="1400" dirty="0">
-              <a:solidFill>
-                <a:schemeClr val="tx1"/>
-              </a:solidFill>
-            </a:endParaRPr>
           </a:p>
         </p:txBody>
       </p:sp>
@@ -17413,11 +18320,6 @@
               </a:rPr>
               <a:t>16. Agradecimentos</a:t>
             </a:r>
-            <a:endParaRPr lang="pt-BR" sz="1400" dirty="0">
-              <a:solidFill>
-                <a:schemeClr val="tx1"/>
-              </a:solidFill>
-            </a:endParaRPr>
           </a:p>
         </p:txBody>
       </p:sp>
@@ -17813,7 +18715,7 @@
   <a:extraClrSchemeLst/>
   <a:extLst>
     <a:ext uri="{05A4C25C-085E-4340-85A3-A5531E510DB2}">
-      <thm15:themeFamily xmlns:thm15="http://schemas.microsoft.com/office/thememl/2012/main" name="Slice" id="{0507925B-6AC9-4358-8E18-C330545D08F8}" vid="{19759155-7935-4C61-A06C-C04380D1B16E}"/>
+      <thm15:themeFamily xmlns:thm15="http://schemas.microsoft.com/office/thememl/2012/main" xmlns="" name="Slice" id="{0507925B-6AC9-4358-8E18-C330545D08F8}" vid="{19759155-7935-4C61-A06C-C04380D1B16E}"/>
     </a:ext>
   </a:extLst>
 </a:theme>
@@ -18074,7 +18976,7 @@
   <a:extraClrSchemeLst/>
   <a:extLst>
     <a:ext uri="{05A4C25C-085E-4340-85A3-A5531E510DB2}">
-      <thm15:themeFamily xmlns:thm15="http://schemas.microsoft.com/office/thememl/2012/main" name="Office Theme" id="{62F939B6-93AF-4DB8-9C6B-D6C7DFDC589F}" vid="{4A3C46E8-61CC-4603-A589-7422A47A8E4A}"/>
+      <thm15:themeFamily xmlns:thm15="http://schemas.microsoft.com/office/thememl/2012/main" xmlns="" name="Office Theme" id="{62F939B6-93AF-4DB8-9C6B-D6C7DFDC589F}" vid="{4A3C46E8-61CC-4603-A589-7422A47A8E4A}"/>
     </a:ext>
   </a:extLst>
 </a:theme>

</xml_diff>